<commit_message>
Update color of text
change to white the font and fix logo with title
</commit_message>
<xml_diff>
--- a/walmart_presentation.pptx
+++ b/walmart_presentation.pptx
@@ -10339,7 +10339,7 @@
           <a:p>
             <a:fld id="{72345051-2045-45DA-935E-2E3CA1A69ADC}" type="datetimeFigureOut">
               <a:rPr lang="en-US" smtClean="0"/>
-              <a:t>11/7/22</a:t>
+              <a:t>11/11/22</a:t>
             </a:fld>
             <a:endParaRPr lang="en-US" dirty="0"/>
           </a:p>
@@ -10673,7 +10673,7 @@
           <a:p>
             <a:fld id="{72345051-2045-45DA-935E-2E3CA1A69ADC}" type="datetimeFigureOut">
               <a:rPr lang="en-US" smtClean="0"/>
-              <a:t>11/7/22</a:t>
+              <a:t>11/11/22</a:t>
             </a:fld>
             <a:endParaRPr lang="en-US" dirty="0"/>
           </a:p>
@@ -10951,7 +10951,7 @@
           <a:p>
             <a:fld id="{72345051-2045-45DA-935E-2E3CA1A69ADC}" type="datetimeFigureOut">
               <a:rPr lang="en-US" smtClean="0"/>
-              <a:t>11/7/22</a:t>
+              <a:t>11/11/22</a:t>
             </a:fld>
             <a:endParaRPr lang="en-US" dirty="0"/>
           </a:p>
@@ -11519,7 +11519,7 @@
           <a:p>
             <a:fld id="{72345051-2045-45DA-935E-2E3CA1A69ADC}" type="datetimeFigureOut">
               <a:rPr lang="en-US" smtClean="0"/>
-              <a:t>11/7/22</a:t>
+              <a:t>11/11/22</a:t>
             </a:fld>
             <a:endParaRPr lang="en-US" dirty="0"/>
           </a:p>
@@ -11797,7 +11797,7 @@
           <a:p>
             <a:fld id="{72345051-2045-45DA-935E-2E3CA1A69ADC}" type="datetimeFigureOut">
               <a:rPr lang="en-US" smtClean="0"/>
-              <a:t>11/7/22</a:t>
+              <a:t>11/11/22</a:t>
             </a:fld>
             <a:endParaRPr lang="en-US" dirty="0"/>
           </a:p>
@@ -12359,7 +12359,7 @@
           <a:p>
             <a:fld id="{72345051-2045-45DA-935E-2E3CA1A69ADC}" type="datetimeFigureOut">
               <a:rPr lang="en-US" smtClean="0"/>
-              <a:t>11/7/22</a:t>
+              <a:t>11/11/22</a:t>
             </a:fld>
             <a:endParaRPr lang="en-US" dirty="0"/>
           </a:p>
@@ -12686,7 +12686,7 @@
           <a:p>
             <a:fld id="{72345051-2045-45DA-935E-2E3CA1A69ADC}" type="datetimeFigureOut">
               <a:rPr lang="en-US" smtClean="0"/>
-              <a:t>11/7/22</a:t>
+              <a:t>11/11/22</a:t>
             </a:fld>
             <a:endParaRPr lang="en-US" dirty="0"/>
           </a:p>
@@ -12863,7 +12863,7 @@
           <a:p>
             <a:fld id="{72345051-2045-45DA-935E-2E3CA1A69ADC}" type="datetimeFigureOut">
               <a:rPr lang="en-US" smtClean="0"/>
-              <a:t>11/7/22</a:t>
+              <a:t>11/11/22</a:t>
             </a:fld>
             <a:endParaRPr lang="en-US"/>
           </a:p>
@@ -13101,7 +13101,7 @@
           <a:p>
             <a:fld id="{72345051-2045-45DA-935E-2E3CA1A69ADC}" type="datetimeFigureOut">
               <a:rPr lang="en-US" smtClean="0"/>
-              <a:t>11/7/22</a:t>
+              <a:t>11/11/22</a:t>
             </a:fld>
             <a:endParaRPr lang="en-US"/>
           </a:p>
@@ -13301,7 +13301,7 @@
           <a:p>
             <a:fld id="{72345051-2045-45DA-935E-2E3CA1A69ADC}" type="datetimeFigureOut">
               <a:rPr lang="en-US" smtClean="0"/>
-              <a:t>11/7/22</a:t>
+              <a:t>11/11/22</a:t>
             </a:fld>
             <a:endParaRPr lang="en-US"/>
           </a:p>
@@ -13577,7 +13577,7 @@
           <a:p>
             <a:fld id="{72345051-2045-45DA-935E-2E3CA1A69ADC}" type="datetimeFigureOut">
               <a:rPr lang="en-US" smtClean="0"/>
-              <a:t>11/7/22</a:t>
+              <a:t>11/11/22</a:t>
             </a:fld>
             <a:endParaRPr lang="en-US"/>
           </a:p>
@@ -13843,7 +13843,7 @@
           <a:p>
             <a:fld id="{72345051-2045-45DA-935E-2E3CA1A69ADC}" type="datetimeFigureOut">
               <a:rPr lang="en-US" smtClean="0"/>
-              <a:t>11/7/22</a:t>
+              <a:t>11/11/22</a:t>
             </a:fld>
             <a:endParaRPr lang="en-US"/>
           </a:p>
@@ -14217,7 +14217,7 @@
           <a:p>
             <a:fld id="{72345051-2045-45DA-935E-2E3CA1A69ADC}" type="datetimeFigureOut">
               <a:rPr lang="en-US" smtClean="0"/>
-              <a:t>11/7/22</a:t>
+              <a:t>11/11/22</a:t>
             </a:fld>
             <a:endParaRPr lang="en-US" dirty="0"/>
           </a:p>
@@ -14365,7 +14365,7 @@
           <a:p>
             <a:fld id="{72345051-2045-45DA-935E-2E3CA1A69ADC}" type="datetimeFigureOut">
               <a:rPr lang="en-US" smtClean="0"/>
-              <a:t>11/7/22</a:t>
+              <a:t>11/11/22</a:t>
             </a:fld>
             <a:endParaRPr lang="en-US"/>
           </a:p>
@@ -14490,7 +14490,7 @@
           <a:p>
             <a:fld id="{72345051-2045-45DA-935E-2E3CA1A69ADC}" type="datetimeFigureOut">
               <a:rPr lang="en-US" smtClean="0"/>
-              <a:t>11/7/22</a:t>
+              <a:t>11/11/22</a:t>
             </a:fld>
             <a:endParaRPr lang="en-US"/>
           </a:p>
@@ -14775,7 +14775,7 @@
           <a:p>
             <a:fld id="{72345051-2045-45DA-935E-2E3CA1A69ADC}" type="datetimeFigureOut">
               <a:rPr lang="en-US" smtClean="0"/>
-              <a:t>11/7/22</a:t>
+              <a:t>11/11/22</a:t>
             </a:fld>
             <a:endParaRPr lang="en-US"/>
           </a:p>
@@ -15099,7 +15099,7 @@
           <a:p>
             <a:fld id="{72345051-2045-45DA-935E-2E3CA1A69ADC}" type="datetimeFigureOut">
               <a:rPr lang="en-US" smtClean="0"/>
-              <a:t>11/7/22</a:t>
+              <a:t>11/11/22</a:t>
             </a:fld>
             <a:endParaRPr lang="en-US"/>
           </a:p>
@@ -15313,7 +15313,7 @@
           <a:p>
             <a:fld id="{72345051-2045-45DA-935E-2E3CA1A69ADC}" type="datetimeFigureOut">
               <a:rPr lang="en-US" smtClean="0"/>
-              <a:t>11/7/22</a:t>
+              <a:t>11/11/22</a:t>
             </a:fld>
             <a:endParaRPr lang="en-US" dirty="0"/>
           </a:p>
@@ -16901,13 +16901,7 @@
           <a:p>
             <a:pPr algn="r"/>
             <a:r>
-              <a:rPr lang="en-US" sz="4800" dirty="0">
-                <a:solidFill>
-                  <a:schemeClr val="bg2">
-                    <a:lumMod val="75000"/>
-                  </a:schemeClr>
-                </a:solidFill>
-              </a:rPr>
+              <a:rPr lang="en-US" sz="4800" dirty="0"/>
               <a:t>Business Problem</a:t>
             </a:r>
           </a:p>
@@ -16931,7 +16925,7 @@
         </p:nvSpPr>
         <p:spPr>
           <a:xfrm>
-            <a:off x="6204459" y="4546284"/>
+            <a:off x="6204459" y="4661898"/>
             <a:ext cx="5828145" cy="1346201"/>
           </a:xfrm>
         </p:spPr>
@@ -16945,13 +16939,7 @@
               <a:buNone/>
             </a:pPr>
             <a:r>
-              <a:rPr lang="en-US" dirty="0">
-                <a:solidFill>
-                  <a:schemeClr val="bg2">
-                    <a:lumMod val="75000"/>
-                  </a:schemeClr>
-                </a:solidFill>
-              </a:rPr>
+              <a:rPr lang="en-US" dirty="0"/>
               <a:t>Walmart has been running out of stock during busy periods recently and are looking for a way to predict future sales In order to maintain appropriate levels of stock. </a:t>
             </a:r>
           </a:p>
@@ -17990,41 +17978,6 @@
       </p:grpSpPr>
       <p:sp>
         <p:nvSpPr>
-          <p:cNvPr id="2" name="Title 1">
-            <a:extLst>
-              <a:ext uri="{FF2B5EF4-FFF2-40B4-BE49-F238E27FC236}">
-                <a16:creationId xmlns:a16="http://schemas.microsoft.com/office/drawing/2014/main" id="{F7490153-C730-81D7-32E0-7B8A7400D494}"/>
-              </a:ext>
-            </a:extLst>
-          </p:cNvPr>
-          <p:cNvSpPr>
-            <a:spLocks noGrp="1"/>
-          </p:cNvSpPr>
-          <p:nvPr>
-            <p:ph type="title"/>
-          </p:nvPr>
-        </p:nvSpPr>
-        <p:spPr>
-          <a:xfrm>
-            <a:off x="1302423" y="302461"/>
-            <a:ext cx="3002446" cy="1453363"/>
-          </a:xfrm>
-        </p:spPr>
-        <p:txBody>
-          <a:bodyPr>
-            <a:normAutofit/>
-          </a:bodyPr>
-          <a:lstStyle/>
-          <a:p>
-            <a:r>
-              <a:rPr lang="en-US" dirty="0"/>
-              <a:t>Conclusion</a:t>
-            </a:r>
-          </a:p>
-        </p:txBody>
-      </p:sp>
-      <p:sp>
-        <p:nvSpPr>
           <p:cNvPr id="33" name="Content Placeholder 2">
             <a:extLst>
               <a:ext uri="{FF2B5EF4-FFF2-40B4-BE49-F238E27FC236}">
@@ -18425,6 +18378,41 @@
           </a:effectLst>
         </p:spPr>
       </p:pic>
+      <p:sp>
+        <p:nvSpPr>
+          <p:cNvPr id="2" name="Title 1">
+            <a:extLst>
+              <a:ext uri="{FF2B5EF4-FFF2-40B4-BE49-F238E27FC236}">
+                <a16:creationId xmlns:a16="http://schemas.microsoft.com/office/drawing/2014/main" id="{F7490153-C730-81D7-32E0-7B8A7400D494}"/>
+              </a:ext>
+            </a:extLst>
+          </p:cNvPr>
+          <p:cNvSpPr>
+            <a:spLocks noGrp="1"/>
+          </p:cNvSpPr>
+          <p:nvPr>
+            <p:ph type="title"/>
+          </p:nvPr>
+        </p:nvSpPr>
+        <p:spPr>
+          <a:xfrm>
+            <a:off x="1302423" y="302461"/>
+            <a:ext cx="3002446" cy="1453363"/>
+          </a:xfrm>
+        </p:spPr>
+        <p:txBody>
+          <a:bodyPr>
+            <a:normAutofit/>
+          </a:bodyPr>
+          <a:lstStyle/>
+          <a:p>
+            <a:r>
+              <a:rPr lang="en-US" dirty="0"/>
+              <a:t>Conclusion</a:t>
+            </a:r>
+          </a:p>
+        </p:txBody>
+      </p:sp>
     </p:spTree>
     <p:extLst>
       <p:ext uri="{BB962C8B-B14F-4D97-AF65-F5344CB8AC3E}">

</xml_diff>